<commit_message>
Commit for cache feature
</commit_message>
<xml_diff>
--- a/Page Object Model.pptx
+++ b/Page Object Model.pptx
@@ -7,12 +7,13 @@
   <p:sldIdLst>
     <p:sldId id="256" r:id="rId2"/>
     <p:sldId id="257" r:id="rId3"/>
-    <p:sldId id="258" r:id="rId4"/>
-    <p:sldId id="259" r:id="rId5"/>
-    <p:sldId id="260" r:id="rId6"/>
-    <p:sldId id="261" r:id="rId7"/>
+    <p:sldId id="266" r:id="rId4"/>
+    <p:sldId id="258" r:id="rId5"/>
+    <p:sldId id="265" r:id="rId6"/>
+    <p:sldId id="260" r:id="rId7"/>
     <p:sldId id="263" r:id="rId8"/>
     <p:sldId id="264" r:id="rId9"/>
+    <p:sldId id="259" r:id="rId10"/>
   </p:sldIdLst>
   <p:sldSz cx="9144000" cy="6858000" type="screen4x3"/>
   <p:notesSz cx="6858000" cy="9144000"/>
@@ -302,7 +303,7 @@
           <a:p>
             <a:fld id="{0ACE9716-E01B-4736-930C-3ABDFD8D78A9}" type="datetimeFigureOut">
               <a:rPr lang="en-US" smtClean="0"/>
-              <a:t>7/9/2017</a:t>
+              <a:t>7/23/2017</a:t>
             </a:fld>
             <a:endParaRPr lang="en-US"/>
           </a:p>
@@ -502,7 +503,7 @@
           <a:p>
             <a:fld id="{0ACE9716-E01B-4736-930C-3ABDFD8D78A9}" type="datetimeFigureOut">
               <a:rPr lang="en-US" smtClean="0"/>
-              <a:t>7/9/2017</a:t>
+              <a:t>7/23/2017</a:t>
             </a:fld>
             <a:endParaRPr lang="en-US"/>
           </a:p>
@@ -677,7 +678,7 @@
           <a:p>
             <a:fld id="{0ACE9716-E01B-4736-930C-3ABDFD8D78A9}" type="datetimeFigureOut">
               <a:rPr lang="en-US" smtClean="0"/>
-              <a:t>7/9/2017</a:t>
+              <a:t>7/23/2017</a:t>
             </a:fld>
             <a:endParaRPr lang="en-US"/>
           </a:p>
@@ -842,7 +843,7 @@
           <a:p>
             <a:fld id="{0ACE9716-E01B-4736-930C-3ABDFD8D78A9}" type="datetimeFigureOut">
               <a:rPr lang="en-US" smtClean="0"/>
-              <a:t>7/9/2017</a:t>
+              <a:t>7/23/2017</a:t>
             </a:fld>
             <a:endParaRPr lang="en-US"/>
           </a:p>
@@ -1090,7 +1091,7 @@
           <a:p>
             <a:fld id="{0ACE9716-E01B-4736-930C-3ABDFD8D78A9}" type="datetimeFigureOut">
               <a:rPr lang="en-US" smtClean="0"/>
-              <a:t>7/9/2017</a:t>
+              <a:t>7/23/2017</a:t>
             </a:fld>
             <a:endParaRPr lang="en-US"/>
           </a:p>
@@ -1408,7 +1409,7 @@
           <a:p>
             <a:fld id="{0ACE9716-E01B-4736-930C-3ABDFD8D78A9}" type="datetimeFigureOut">
               <a:rPr lang="en-US" smtClean="0"/>
-              <a:t>7/9/2017</a:t>
+              <a:t>7/23/2017</a:t>
             </a:fld>
             <a:endParaRPr lang="en-US"/>
           </a:p>
@@ -1874,7 +1875,7 @@
           <a:p>
             <a:fld id="{0ACE9716-E01B-4736-930C-3ABDFD8D78A9}" type="datetimeFigureOut">
               <a:rPr lang="en-US" smtClean="0"/>
-              <a:t>7/9/2017</a:t>
+              <a:t>7/23/2017</a:t>
             </a:fld>
             <a:endParaRPr lang="en-US"/>
           </a:p>
@@ -2022,7 +2023,7 @@
           <a:p>
             <a:fld id="{0ACE9716-E01B-4736-930C-3ABDFD8D78A9}" type="datetimeFigureOut">
               <a:rPr lang="en-US" smtClean="0"/>
-              <a:t>7/9/2017</a:t>
+              <a:t>7/23/2017</a:t>
             </a:fld>
             <a:endParaRPr lang="en-US"/>
           </a:p>
@@ -2112,7 +2113,7 @@
           <a:p>
             <a:fld id="{0ACE9716-E01B-4736-930C-3ABDFD8D78A9}" type="datetimeFigureOut">
               <a:rPr lang="en-US" smtClean="0"/>
-              <a:t>7/9/2017</a:t>
+              <a:t>7/23/2017</a:t>
             </a:fld>
             <a:endParaRPr lang="en-US"/>
           </a:p>
@@ -2386,7 +2387,7 @@
           <a:p>
             <a:fld id="{0ACE9716-E01B-4736-930C-3ABDFD8D78A9}" type="datetimeFigureOut">
               <a:rPr lang="en-US" smtClean="0"/>
-              <a:t>7/9/2017</a:t>
+              <a:t>7/23/2017</a:t>
             </a:fld>
             <a:endParaRPr lang="en-US"/>
           </a:p>
@@ -2691,7 +2692,7 @@
           <a:p>
             <a:fld id="{0ACE9716-E01B-4736-930C-3ABDFD8D78A9}" type="datetimeFigureOut">
               <a:rPr lang="en-US" smtClean="0"/>
-              <a:t>7/9/2017</a:t>
+              <a:t>7/23/2017</a:t>
             </a:fld>
             <a:endParaRPr lang="en-US"/>
           </a:p>
@@ -2989,7 +2990,7 @@
           <a:p>
             <a:fld id="{0ACE9716-E01B-4736-930C-3ABDFD8D78A9}" type="datetimeFigureOut">
               <a:rPr lang="en-US" smtClean="0"/>
-              <a:t>7/9/2017</a:t>
+              <a:t>7/23/2017</a:t>
             </a:fld>
             <a:endParaRPr lang="en-US"/>
           </a:p>
@@ -3641,6 +3642,29 @@
               </a:rPr>
               <a:t>Annotation in TestNG</a:t>
             </a:r>
+          </a:p>
+          <a:p>
+            <a:pPr marL="571500" indent="-571500">
+              <a:buClr>
+                <a:srgbClr val="00B0F0"/>
+              </a:buClr>
+              <a:buFont typeface="Wingdings" pitchFamily="2" charset="2"/>
+              <a:buChar char="Ø"/>
+            </a:pPr>
+            <a:r>
+              <a:rPr lang="en-US" dirty="0" smtClean="0">
+                <a:latin typeface="Aparajita" pitchFamily="34" charset="0"/>
+                <a:cs typeface="Aparajita" pitchFamily="34" charset="0"/>
+              </a:rPr>
+              <a:t>Implementation of </a:t>
+            </a:r>
+            <a:r>
+              <a:rPr lang="en-US" smtClean="0">
+                <a:latin typeface="Aparajita" pitchFamily="34" charset="0"/>
+                <a:cs typeface="Aparajita" pitchFamily="34" charset="0"/>
+              </a:rPr>
+              <a:t>Extent Report</a:t>
+            </a:r>
             <a:endParaRPr lang="en-US" dirty="0">
               <a:latin typeface="Aparajita" pitchFamily="34" charset="0"/>
               <a:cs typeface="Aparajita" pitchFamily="34" charset="0"/>
@@ -3800,8 +3824,8 @@
             <a:r>
               <a:rPr lang="en-US" sz="3600" b="1" i="1" dirty="0" smtClean="0">
                 <a:solidFill>
-                  <a:schemeClr val="accent4">
-                    <a:lumMod val="75000"/>
+                  <a:schemeClr val="accent5">
+                    <a:lumMod val="50000"/>
                   </a:schemeClr>
                 </a:solidFill>
                 <a:latin typeface="Aparajita" pitchFamily="34" charset="0"/>
@@ -3812,8 +3836,8 @@
             <a:r>
               <a:rPr lang="en-US" sz="3600" b="1" i="1" dirty="0">
                 <a:solidFill>
-                  <a:schemeClr val="accent4">
-                    <a:lumMod val="75000"/>
+                  <a:schemeClr val="accent5">
+                    <a:lumMod val="50000"/>
                   </a:schemeClr>
                 </a:solidFill>
                 <a:latin typeface="Aparajita" pitchFamily="34" charset="0"/>
@@ -3824,8 +3848,8 @@
             <a:r>
               <a:rPr lang="en-US" sz="3600" b="1" i="1" dirty="0" smtClean="0">
                 <a:solidFill>
-                  <a:schemeClr val="accent4">
-                    <a:lumMod val="75000"/>
+                  <a:schemeClr val="accent5">
+                    <a:lumMod val="50000"/>
                   </a:schemeClr>
                 </a:solidFill>
                 <a:latin typeface="Aparajita" pitchFamily="34" charset="0"/>
@@ -4325,8 +4349,8 @@
         </p:nvSpPr>
         <p:spPr>
           <a:xfrm>
-            <a:off x="0" y="1219200"/>
-            <a:ext cx="8305800" cy="5410200"/>
+            <a:off x="0" y="914400"/>
+            <a:ext cx="9144000" cy="5715000"/>
           </a:xfrm>
         </p:spPr>
         <p:txBody>
@@ -4335,89 +4359,6 @@
           </a:bodyPr>
           <a:lstStyle/>
           <a:p>
-            <a:pPr marL="571500" indent="-571500">
-              <a:buClr>
-                <a:srgbClr val="00B0F0"/>
-              </a:buClr>
-              <a:buFont typeface="Wingdings" pitchFamily="2" charset="2"/>
-              <a:buChar char="Ø"/>
-            </a:pPr>
-            <a:r>
-              <a:rPr lang="en-US" sz="2800" b="1" i="1" dirty="0" smtClean="0">
-                <a:latin typeface="Aparajita" pitchFamily="34" charset="0"/>
-                <a:cs typeface="Aparajita" pitchFamily="34" charset="0"/>
-              </a:rPr>
-              <a:t>Advantages of POM</a:t>
-            </a:r>
-          </a:p>
-          <a:p>
-            <a:pPr marL="571500" indent="-571500">
-              <a:buClr>
-                <a:srgbClr val="00B0F0"/>
-              </a:buClr>
-              <a:buFont typeface="+mj-lt"/>
-              <a:buAutoNum type="romanLcPeriod"/>
-            </a:pPr>
-            <a:r>
-              <a:rPr lang="en-US" sz="2800" dirty="0" smtClean="0">
-                <a:latin typeface="Aparajita" pitchFamily="34" charset="0"/>
-                <a:cs typeface="Aparajita" pitchFamily="34" charset="0"/>
-              </a:rPr>
-              <a:t>Script will be more readable format.</a:t>
-            </a:r>
-          </a:p>
-          <a:p>
-            <a:pPr marL="571500" indent="-571500">
-              <a:buClr>
-                <a:srgbClr val="00B0F0"/>
-              </a:buClr>
-              <a:buFont typeface="+mj-lt"/>
-              <a:buAutoNum type="romanLcPeriod"/>
-            </a:pPr>
-            <a:r>
-              <a:rPr lang="en-US" sz="2800" dirty="0" smtClean="0">
-                <a:latin typeface="Aparajita" pitchFamily="34" charset="0"/>
-                <a:cs typeface="Aparajita" pitchFamily="34" charset="0"/>
-              </a:rPr>
-              <a:t>Easy to maintain and reusable script.</a:t>
-            </a:r>
-          </a:p>
-          <a:p>
-            <a:pPr marL="571500" indent="-571500">
-              <a:buClr>
-                <a:srgbClr val="00B0F0"/>
-              </a:buClr>
-              <a:buFont typeface="+mj-lt"/>
-              <a:buAutoNum type="romanLcPeriod"/>
-            </a:pPr>
-            <a:r>
-              <a:rPr lang="en-US" sz="2800" dirty="0" smtClean="0">
-                <a:latin typeface="Aparajita" pitchFamily="34" charset="0"/>
-                <a:cs typeface="Aparajita" pitchFamily="34" charset="0"/>
-              </a:rPr>
-              <a:t>We can make use of cache feature.</a:t>
-            </a:r>
-          </a:p>
-          <a:p>
-            <a:pPr marL="857250" indent="-857250">
-              <a:buFont typeface="+mj-lt"/>
-              <a:buAutoNum type="romanLcPeriod"/>
-            </a:pPr>
-            <a:endParaRPr lang="en-US" sz="2800" dirty="0" smtClean="0">
-              <a:solidFill>
-                <a:schemeClr val="accent6">
-                  <a:lumMod val="50000"/>
-                </a:schemeClr>
-              </a:solidFill>
-              <a:latin typeface="Aparajita" pitchFamily="34" charset="0"/>
-              <a:cs typeface="Aparajita" pitchFamily="34" charset="0"/>
-            </a:endParaRPr>
-          </a:p>
-          <a:p>
-            <a:pPr marL="571500" indent="-571500">
-              <a:buFont typeface="Arial" pitchFamily="34" charset="0"/>
-              <a:buChar char="•"/>
-            </a:pPr>
             <a:endParaRPr lang="en-US" sz="3600" dirty="0">
               <a:solidFill>
                 <a:schemeClr val="accent6">
@@ -4428,16 +4369,487 @@
           </a:p>
         </p:txBody>
       </p:sp>
+      <p:sp>
+        <p:nvSpPr>
+          <p:cNvPr id="4" name="Rectangle 3"/>
+          <p:cNvSpPr/>
+          <p:nvPr/>
+        </p:nvSpPr>
+        <p:spPr>
+          <a:xfrm>
+            <a:off x="381000" y="1524000"/>
+            <a:ext cx="1828800" cy="457200"/>
+          </a:xfrm>
+          <a:prstGeom prst="rect">
+            <a:avLst/>
+          </a:prstGeom>
+        </p:spPr>
+        <p:style>
+          <a:lnRef idx="2">
+            <a:schemeClr val="accent1">
+              <a:shade val="50000"/>
+            </a:schemeClr>
+          </a:lnRef>
+          <a:fillRef idx="1">
+            <a:schemeClr val="accent1"/>
+          </a:fillRef>
+          <a:effectRef idx="0">
+            <a:schemeClr val="accent1"/>
+          </a:effectRef>
+          <a:fontRef idx="minor">
+            <a:schemeClr val="lt1"/>
+          </a:fontRef>
+        </p:style>
+        <p:txBody>
+          <a:bodyPr rtlCol="0" anchor="ctr"/>
+          <a:lstStyle/>
+          <a:p>
+            <a:pPr algn="ctr"/>
+            <a:r>
+              <a:rPr lang="en-US" dirty="0" smtClean="0"/>
+              <a:t>Login</a:t>
+            </a:r>
+            <a:endParaRPr lang="en-US" dirty="0"/>
+          </a:p>
+        </p:txBody>
+      </p:sp>
+      <p:sp>
+        <p:nvSpPr>
+          <p:cNvPr id="5" name="Rectangle 4"/>
+          <p:cNvSpPr/>
+          <p:nvPr/>
+        </p:nvSpPr>
+        <p:spPr>
+          <a:xfrm>
+            <a:off x="381000" y="2209800"/>
+            <a:ext cx="1828800" cy="533400"/>
+          </a:xfrm>
+          <a:prstGeom prst="rect">
+            <a:avLst/>
+          </a:prstGeom>
+        </p:spPr>
+        <p:style>
+          <a:lnRef idx="2">
+            <a:schemeClr val="accent1">
+              <a:shade val="50000"/>
+            </a:schemeClr>
+          </a:lnRef>
+          <a:fillRef idx="1">
+            <a:schemeClr val="accent1"/>
+          </a:fillRef>
+          <a:effectRef idx="0">
+            <a:schemeClr val="accent1"/>
+          </a:effectRef>
+          <a:fontRef idx="minor">
+            <a:schemeClr val="lt1"/>
+          </a:fontRef>
+        </p:style>
+        <p:txBody>
+          <a:bodyPr rtlCol="0" anchor="ctr"/>
+          <a:lstStyle/>
+          <a:p>
+            <a:pPr algn="ctr"/>
+            <a:r>
+              <a:rPr lang="en-US" dirty="0" smtClean="0"/>
+              <a:t>Homepage</a:t>
+            </a:r>
+            <a:endParaRPr lang="en-US" dirty="0"/>
+          </a:p>
+        </p:txBody>
+      </p:sp>
+      <p:sp>
+        <p:nvSpPr>
+          <p:cNvPr id="6" name="Rectangle 5"/>
+          <p:cNvSpPr/>
+          <p:nvPr/>
+        </p:nvSpPr>
+        <p:spPr>
+          <a:xfrm>
+            <a:off x="381000" y="3048000"/>
+            <a:ext cx="1828800" cy="533400"/>
+          </a:xfrm>
+          <a:prstGeom prst="rect">
+            <a:avLst/>
+          </a:prstGeom>
+        </p:spPr>
+        <p:style>
+          <a:lnRef idx="2">
+            <a:schemeClr val="accent1">
+              <a:shade val="50000"/>
+            </a:schemeClr>
+          </a:lnRef>
+          <a:fillRef idx="1">
+            <a:schemeClr val="accent1"/>
+          </a:fillRef>
+          <a:effectRef idx="0">
+            <a:schemeClr val="accent1"/>
+          </a:effectRef>
+          <a:fontRef idx="minor">
+            <a:schemeClr val="lt1"/>
+          </a:fontRef>
+        </p:style>
+        <p:txBody>
+          <a:bodyPr rtlCol="0" anchor="ctr"/>
+          <a:lstStyle/>
+          <a:p>
+            <a:pPr algn="ctr"/>
+            <a:r>
+              <a:rPr lang="en-US" smtClean="0"/>
+              <a:t>Pyment</a:t>
+            </a:r>
+            <a:endParaRPr lang="en-US" dirty="0"/>
+          </a:p>
+        </p:txBody>
+      </p:sp>
+      <p:sp>
+        <p:nvSpPr>
+          <p:cNvPr id="7" name="Rectangle 6"/>
+          <p:cNvSpPr/>
+          <p:nvPr/>
+        </p:nvSpPr>
+        <p:spPr>
+          <a:xfrm>
+            <a:off x="381000" y="3810000"/>
+            <a:ext cx="1828800" cy="457200"/>
+          </a:xfrm>
+          <a:prstGeom prst="rect">
+            <a:avLst/>
+          </a:prstGeom>
+        </p:spPr>
+        <p:style>
+          <a:lnRef idx="2">
+            <a:schemeClr val="accent1">
+              <a:shade val="50000"/>
+            </a:schemeClr>
+          </a:lnRef>
+          <a:fillRef idx="1">
+            <a:schemeClr val="accent1"/>
+          </a:fillRef>
+          <a:effectRef idx="0">
+            <a:schemeClr val="accent1"/>
+          </a:effectRef>
+          <a:fontRef idx="minor">
+            <a:schemeClr val="lt1"/>
+          </a:fontRef>
+        </p:style>
+        <p:txBody>
+          <a:bodyPr rtlCol="0" anchor="ctr"/>
+          <a:lstStyle/>
+          <a:p>
+            <a:pPr algn="ctr"/>
+            <a:r>
+              <a:rPr lang="en-US" dirty="0" smtClean="0"/>
+              <a:t>Logout</a:t>
+            </a:r>
+            <a:endParaRPr lang="en-US" dirty="0"/>
+          </a:p>
+        </p:txBody>
+      </p:sp>
+      <p:cxnSp>
+        <p:nvCxnSpPr>
+          <p:cNvPr id="9" name="Straight Arrow Connector 8"/>
+          <p:cNvCxnSpPr/>
+          <p:nvPr/>
+        </p:nvCxnSpPr>
+        <p:spPr>
+          <a:xfrm>
+            <a:off x="1295400" y="1981200"/>
+            <a:ext cx="0" cy="228600"/>
+          </a:xfrm>
+          <a:prstGeom prst="straightConnector1">
+            <a:avLst/>
+          </a:prstGeom>
+          <a:ln>
+            <a:tailEnd type="arrow"/>
+          </a:ln>
+        </p:spPr>
+        <p:style>
+          <a:lnRef idx="1">
+            <a:schemeClr val="accent1"/>
+          </a:lnRef>
+          <a:fillRef idx="0">
+            <a:schemeClr val="accent1"/>
+          </a:fillRef>
+          <a:effectRef idx="0">
+            <a:schemeClr val="accent1"/>
+          </a:effectRef>
+          <a:fontRef idx="minor">
+            <a:schemeClr val="tx1"/>
+          </a:fontRef>
+        </p:style>
+      </p:cxnSp>
+      <p:cxnSp>
+        <p:nvCxnSpPr>
+          <p:cNvPr id="11" name="Straight Arrow Connector 10"/>
+          <p:cNvCxnSpPr>
+            <a:endCxn id="6" idx="0"/>
+          </p:cNvCxnSpPr>
+          <p:nvPr/>
+        </p:nvCxnSpPr>
+        <p:spPr>
+          <a:xfrm>
+            <a:off x="1295400" y="2743200"/>
+            <a:ext cx="0" cy="304800"/>
+          </a:xfrm>
+          <a:prstGeom prst="straightConnector1">
+            <a:avLst/>
+          </a:prstGeom>
+          <a:ln>
+            <a:tailEnd type="arrow"/>
+          </a:ln>
+        </p:spPr>
+        <p:style>
+          <a:lnRef idx="1">
+            <a:schemeClr val="accent1"/>
+          </a:lnRef>
+          <a:fillRef idx="0">
+            <a:schemeClr val="accent1"/>
+          </a:fillRef>
+          <a:effectRef idx="0">
+            <a:schemeClr val="accent1"/>
+          </a:effectRef>
+          <a:fontRef idx="minor">
+            <a:schemeClr val="tx1"/>
+          </a:fontRef>
+        </p:style>
+      </p:cxnSp>
+      <p:cxnSp>
+        <p:nvCxnSpPr>
+          <p:cNvPr id="13" name="Straight Arrow Connector 12"/>
+          <p:cNvCxnSpPr>
+            <a:endCxn id="7" idx="0"/>
+          </p:cNvCxnSpPr>
+          <p:nvPr/>
+        </p:nvCxnSpPr>
+        <p:spPr>
+          <a:xfrm>
+            <a:off x="1295400" y="3581400"/>
+            <a:ext cx="0" cy="228600"/>
+          </a:xfrm>
+          <a:prstGeom prst="straightConnector1">
+            <a:avLst/>
+          </a:prstGeom>
+          <a:ln>
+            <a:tailEnd type="arrow"/>
+          </a:ln>
+        </p:spPr>
+        <p:style>
+          <a:lnRef idx="1">
+            <a:schemeClr val="accent1"/>
+          </a:lnRef>
+          <a:fillRef idx="0">
+            <a:schemeClr val="accent1"/>
+          </a:fillRef>
+          <a:effectRef idx="0">
+            <a:schemeClr val="accent1"/>
+          </a:effectRef>
+          <a:fontRef idx="minor">
+            <a:schemeClr val="tx1"/>
+          </a:fontRef>
+        </p:style>
+      </p:cxnSp>
+      <p:sp>
+        <p:nvSpPr>
+          <p:cNvPr id="14" name="Oval 13"/>
+          <p:cNvSpPr/>
+          <p:nvPr/>
+        </p:nvSpPr>
+        <p:spPr>
+          <a:xfrm>
+            <a:off x="6201616" y="2114550"/>
+            <a:ext cx="1371600" cy="952500"/>
+          </a:xfrm>
+          <a:prstGeom prst="ellipse">
+            <a:avLst/>
+          </a:prstGeom>
+        </p:spPr>
+        <p:style>
+          <a:lnRef idx="2">
+            <a:schemeClr val="accent1">
+              <a:shade val="50000"/>
+            </a:schemeClr>
+          </a:lnRef>
+          <a:fillRef idx="1">
+            <a:schemeClr val="accent1"/>
+          </a:fillRef>
+          <a:effectRef idx="0">
+            <a:schemeClr val="accent1"/>
+          </a:effectRef>
+          <a:fontRef idx="minor">
+            <a:schemeClr val="lt1"/>
+          </a:fontRef>
+        </p:style>
+        <p:txBody>
+          <a:bodyPr rtlCol="0" anchor="ctr"/>
+          <a:lstStyle/>
+          <a:p>
+            <a:pPr algn="ctr"/>
+            <a:r>
+              <a:rPr lang="en-US" dirty="0" smtClean="0"/>
+              <a:t>TC1</a:t>
+            </a:r>
+            <a:endParaRPr lang="en-US" dirty="0"/>
+          </a:p>
+        </p:txBody>
+      </p:sp>
+      <p:cxnSp>
+        <p:nvCxnSpPr>
+          <p:cNvPr id="24" name="Straight Arrow Connector 23"/>
+          <p:cNvCxnSpPr/>
+          <p:nvPr/>
+        </p:nvCxnSpPr>
+        <p:spPr>
+          <a:xfrm>
+            <a:off x="2286000" y="2590800"/>
+            <a:ext cx="3886200" cy="152400"/>
+          </a:xfrm>
+          <a:prstGeom prst="straightConnector1">
+            <a:avLst/>
+          </a:prstGeom>
+          <a:ln>
+            <a:headEnd type="arrow"/>
+            <a:tailEnd type="arrow"/>
+          </a:ln>
+        </p:spPr>
+        <p:style>
+          <a:lnRef idx="1">
+            <a:schemeClr val="accent1"/>
+          </a:lnRef>
+          <a:fillRef idx="0">
+            <a:schemeClr val="accent1"/>
+          </a:fillRef>
+          <a:effectRef idx="0">
+            <a:schemeClr val="accent1"/>
+          </a:effectRef>
+          <a:fontRef idx="minor">
+            <a:schemeClr val="tx1"/>
+          </a:fontRef>
+        </p:style>
+      </p:cxnSp>
+      <p:cxnSp>
+        <p:nvCxnSpPr>
+          <p:cNvPr id="26" name="Straight Arrow Connector 25"/>
+          <p:cNvCxnSpPr/>
+          <p:nvPr/>
+        </p:nvCxnSpPr>
+        <p:spPr>
+          <a:xfrm flipV="1">
+            <a:off x="2209800" y="2743200"/>
+            <a:ext cx="3991816" cy="571500"/>
+          </a:xfrm>
+          <a:prstGeom prst="straightConnector1">
+            <a:avLst/>
+          </a:prstGeom>
+          <a:ln>
+            <a:headEnd type="arrow"/>
+            <a:tailEnd type="arrow"/>
+          </a:ln>
+        </p:spPr>
+        <p:style>
+          <a:lnRef idx="1">
+            <a:schemeClr val="accent1"/>
+          </a:lnRef>
+          <a:fillRef idx="0">
+            <a:schemeClr val="accent1"/>
+          </a:fillRef>
+          <a:effectRef idx="0">
+            <a:schemeClr val="accent1"/>
+          </a:effectRef>
+          <a:fontRef idx="minor">
+            <a:schemeClr val="tx1"/>
+          </a:fontRef>
+        </p:style>
+      </p:cxnSp>
+      <p:cxnSp>
+        <p:nvCxnSpPr>
+          <p:cNvPr id="29" name="Straight Arrow Connector 28"/>
+          <p:cNvCxnSpPr/>
+          <p:nvPr/>
+        </p:nvCxnSpPr>
+        <p:spPr>
+          <a:xfrm flipV="1">
+            <a:off x="2286000" y="2743200"/>
+            <a:ext cx="3915616" cy="1295400"/>
+          </a:xfrm>
+          <a:prstGeom prst="straightConnector1">
+            <a:avLst/>
+          </a:prstGeom>
+          <a:ln>
+            <a:headEnd type="arrow"/>
+            <a:tailEnd type="arrow"/>
+          </a:ln>
+        </p:spPr>
+        <p:style>
+          <a:lnRef idx="1">
+            <a:schemeClr val="accent1"/>
+          </a:lnRef>
+          <a:fillRef idx="0">
+            <a:schemeClr val="accent1"/>
+          </a:fillRef>
+          <a:effectRef idx="0">
+            <a:schemeClr val="accent1"/>
+          </a:effectRef>
+          <a:fontRef idx="minor">
+            <a:schemeClr val="tx1"/>
+          </a:fontRef>
+        </p:style>
+      </p:cxnSp>
+      <p:cxnSp>
+        <p:nvCxnSpPr>
+          <p:cNvPr id="31" name="Straight Arrow Connector 30"/>
+          <p:cNvCxnSpPr/>
+          <p:nvPr/>
+        </p:nvCxnSpPr>
+        <p:spPr>
+          <a:xfrm>
+            <a:off x="2286000" y="1752600"/>
+            <a:ext cx="3915616" cy="990600"/>
+          </a:xfrm>
+          <a:prstGeom prst="straightConnector1">
+            <a:avLst/>
+          </a:prstGeom>
+          <a:ln>
+            <a:headEnd type="arrow"/>
+            <a:tailEnd type="arrow"/>
+          </a:ln>
+        </p:spPr>
+        <p:style>
+          <a:lnRef idx="1">
+            <a:schemeClr val="accent1"/>
+          </a:lnRef>
+          <a:fillRef idx="0">
+            <a:schemeClr val="accent1"/>
+          </a:fillRef>
+          <a:effectRef idx="0">
+            <a:schemeClr val="accent1"/>
+          </a:effectRef>
+          <a:fontRef idx="minor">
+            <a:schemeClr val="tx1"/>
+          </a:fontRef>
+        </p:style>
+      </p:cxnSp>
     </p:spTree>
     <p:extLst>
       <p:ext uri="{BB962C8B-B14F-4D97-AF65-F5344CB8AC3E}">
-        <p14:creationId xmlns:p14="http://schemas.microsoft.com/office/powerpoint/2010/main" val="1762376140"/>
+        <p14:creationId xmlns:p14="http://schemas.microsoft.com/office/powerpoint/2010/main" val="1499770326"/>
       </p:ext>
     </p:extLst>
   </p:cSld>
   <p:clrMapOvr>
     <a:masterClrMapping/>
   </p:clrMapOvr>
+  <mc:AlternateContent xmlns:mc="http://schemas.openxmlformats.org/markup-compatibility/2006" xmlns:p14="http://schemas.microsoft.com/office/powerpoint/2010/main">
+    <mc:Choice Requires="p14">
+      <p:transition spd="slow" p14:dur="800">
+        <p:circle/>
+      </p:transition>
+    </mc:Choice>
+    <mc:Fallback xmlns="">
+      <p:transition spd="slow">
+        <p:circle/>
+      </p:transition>
+    </mc:Fallback>
+  </mc:AlternateContent>
   <p:timing>
     <p:tnLst>
       <p:par>
@@ -4497,7 +4909,7 @@
                 <a:latin typeface="Aparajita" pitchFamily="34" charset="0"/>
                 <a:cs typeface="Aparajita" pitchFamily="34" charset="0"/>
               </a:rPr>
-              <a:t>Extent Report</a:t>
+              <a:t>Page Object Model</a:t>
             </a:r>
             <a:endParaRPr lang="en-US" sz="4800" i="1" dirty="0">
               <a:solidFill>
@@ -4524,8 +4936,8 @@
         </p:nvSpPr>
         <p:spPr>
           <a:xfrm>
-            <a:off x="0" y="914400"/>
-            <a:ext cx="9144000" cy="5715000"/>
+            <a:off x="0" y="1219200"/>
+            <a:ext cx="8305800" cy="5410200"/>
           </a:xfrm>
         </p:spPr>
         <p:txBody>
@@ -4546,19 +4958,8 @@
                 <a:latin typeface="Aparajita" pitchFamily="34" charset="0"/>
                 <a:cs typeface="Aparajita" pitchFamily="34" charset="0"/>
               </a:rPr>
-              <a:t>What is </a:t>
-            </a:r>
-            <a:r>
-              <a:rPr lang="en-US" sz="2800" b="1" i="1" dirty="0" smtClean="0">
-                <a:latin typeface="Aparajita" pitchFamily="34" charset="0"/>
-                <a:cs typeface="Aparajita" pitchFamily="34" charset="0"/>
-              </a:rPr>
-              <a:t>Extent Report</a:t>
-            </a:r>
-            <a:endParaRPr lang="en-US" sz="2800" b="1" i="1" dirty="0" smtClean="0">
-              <a:latin typeface="Aparajita" pitchFamily="34" charset="0"/>
-              <a:cs typeface="Aparajita" pitchFamily="34" charset="0"/>
-            </a:endParaRPr>
+              <a:t>Advantages of POM</a:t>
+            </a:r>
           </a:p>
           <a:p>
             <a:pPr marL="571500" indent="-571500">
@@ -4569,23 +4970,12 @@
               <a:buAutoNum type="romanLcPeriod"/>
             </a:pPr>
             <a:r>
-              <a:rPr lang="en-US" sz="2000" i="1" dirty="0">
-                <a:latin typeface="Aparajita" pitchFamily="34" charset="0"/>
-                <a:cs typeface="Aparajita" pitchFamily="34" charset="0"/>
-              </a:rPr>
-              <a:t>Extent Report is a HTML reporting library for Selenium</a:t>
-            </a:r>
-            <a:r>
-              <a:rPr lang="en-US" sz="2000" dirty="0" smtClean="0">
-                <a:latin typeface="Aparajita" pitchFamily="34" charset="0"/>
-                <a:cs typeface="Aparajita" pitchFamily="34" charset="0"/>
-              </a:rPr>
-              <a:t>.</a:t>
-            </a:r>
-            <a:endParaRPr lang="en-US" sz="2000" dirty="0" smtClean="0">
-              <a:latin typeface="Aparajita" pitchFamily="34" charset="0"/>
-              <a:cs typeface="Aparajita" pitchFamily="34" charset="0"/>
-            </a:endParaRPr>
+              <a:rPr lang="en-US" sz="2800" dirty="0" smtClean="0">
+                <a:latin typeface="Aparajita" pitchFamily="34" charset="0"/>
+                <a:cs typeface="Aparajita" pitchFamily="34" charset="0"/>
+              </a:rPr>
+              <a:t>Script will be more readable format.</a:t>
+            </a:r>
           </a:p>
           <a:p>
             <a:pPr marL="571500" indent="-571500">
@@ -4596,18 +4986,11 @@
               <a:buAutoNum type="romanLcPeriod"/>
             </a:pPr>
             <a:r>
-              <a:rPr lang="en-US" sz="2000" i="1" dirty="0">
-                <a:latin typeface="Aparajita" pitchFamily="34" charset="0"/>
-                <a:cs typeface="Aparajita" pitchFamily="34" charset="0"/>
-              </a:rPr>
-              <a:t>We can use this tool within our TestNG  and BDD automation framework</a:t>
-            </a:r>
-            <a:r>
-              <a:rPr lang="en-US" sz="2000" i="1" dirty="0" smtClean="0">
-                <a:latin typeface="Aparajita" pitchFamily="34" charset="0"/>
-                <a:cs typeface="Aparajita" pitchFamily="34" charset="0"/>
-              </a:rPr>
-              <a:t>.</a:t>
+              <a:rPr lang="en-US" sz="2800" dirty="0" smtClean="0">
+                <a:latin typeface="Aparajita" pitchFamily="34" charset="0"/>
+                <a:cs typeface="Aparajita" pitchFamily="34" charset="0"/>
+              </a:rPr>
+              <a:t>Easy to maintain and reusable script.</a:t>
             </a:r>
           </a:p>
           <a:p>
@@ -4619,43 +5002,12 @@
               <a:buAutoNum type="romanLcPeriod"/>
             </a:pPr>
             <a:r>
-              <a:rPr lang="en-US" sz="2000" i="1" dirty="0">
-                <a:latin typeface="Aparajita" pitchFamily="34" charset="0"/>
-                <a:cs typeface="Aparajita" pitchFamily="34" charset="0"/>
-              </a:rPr>
-              <a:t>Download Extent report library from </a:t>
-            </a:r>
-            <a:r>
-              <a:rPr lang="en-US" sz="2000" b="1" i="1" u="sng" dirty="0">
-                <a:solidFill>
-                  <a:srgbClr val="00B0F0"/>
-                </a:solidFill>
-                <a:latin typeface="Aparajita" pitchFamily="34" charset="0"/>
-                <a:cs typeface="Aparajita" pitchFamily="34" charset="0"/>
-              </a:rPr>
-              <a:t>http://</a:t>
-            </a:r>
-            <a:r>
-              <a:rPr lang="en-US" sz="2000" b="1" i="1" u="sng" dirty="0" smtClean="0">
-                <a:solidFill>
-                  <a:srgbClr val="00B0F0"/>
-                </a:solidFill>
-                <a:latin typeface="Aparajita" pitchFamily="34" charset="0"/>
-                <a:cs typeface="Aparajita" pitchFamily="34" charset="0"/>
-              </a:rPr>
-              <a:t>extentreports.com</a:t>
-            </a:r>
-            <a:r>
-              <a:rPr lang="en-US" sz="2000" i="1" dirty="0" smtClean="0">
-                <a:latin typeface="Aparajita" pitchFamily="34" charset="0"/>
-                <a:cs typeface="Aparajita" pitchFamily="34" charset="0"/>
-              </a:rPr>
-              <a:t>	</a:t>
-            </a:r>
-            <a:endParaRPr lang="en-US" sz="2000" dirty="0" smtClean="0">
-              <a:latin typeface="Aparajita" pitchFamily="34" charset="0"/>
-              <a:cs typeface="Aparajita" pitchFamily="34" charset="0"/>
-            </a:endParaRPr>
+              <a:rPr lang="en-US" sz="2800" dirty="0" smtClean="0">
+                <a:latin typeface="Aparajita" pitchFamily="34" charset="0"/>
+                <a:cs typeface="Aparajita" pitchFamily="34" charset="0"/>
+              </a:rPr>
+              <a:t>We can make use of cache feature.</a:t>
+            </a:r>
           </a:p>
           <a:p>
             <a:pPr marL="857250" indent="-857250">
@@ -4690,7 +5042,7 @@
     </p:spTree>
     <p:extLst>
       <p:ext uri="{BB962C8B-B14F-4D97-AF65-F5344CB8AC3E}">
-        <p14:creationId xmlns:p14="http://schemas.microsoft.com/office/powerpoint/2010/main" val="371780410"/>
+        <p14:creationId xmlns:p14="http://schemas.microsoft.com/office/powerpoint/2010/main" val="1762376140"/>
       </p:ext>
     </p:extLst>
   </p:cSld>
@@ -4756,7 +5108,20 @@
                 <a:latin typeface="Aparajita" pitchFamily="34" charset="0"/>
                 <a:cs typeface="Aparajita" pitchFamily="34" charset="0"/>
               </a:rPr>
-              <a:t>Test NG</a:t>
+              <a:t>Test </a:t>
+            </a:r>
+            <a:r>
+              <a:rPr lang="en-US" sz="4800" i="1" dirty="0" err="1" smtClean="0">
+                <a:solidFill>
+                  <a:schemeClr val="tx1">
+                    <a:lumMod val="75000"/>
+                    <a:lumOff val="25000"/>
+                  </a:schemeClr>
+                </a:solidFill>
+                <a:latin typeface="Aparajita" pitchFamily="34" charset="0"/>
+                <a:cs typeface="Aparajita" pitchFamily="34" charset="0"/>
+              </a:rPr>
+              <a:t>ng</a:t>
             </a:r>
             <a:endParaRPr lang="en-US" sz="4800" i="1" dirty="0">
               <a:solidFill>
@@ -4783,12 +5148,12 @@
         </p:nvSpPr>
         <p:spPr>
           <a:xfrm>
-            <a:off x="0" y="1219200"/>
-            <a:ext cx="8305800" cy="5410200"/>
+            <a:off x="0" y="838200"/>
+            <a:ext cx="9067800" cy="6019800"/>
           </a:xfrm>
         </p:spPr>
         <p:txBody>
-          <a:bodyPr>
+          <a:bodyPr numCol="1">
             <a:normAutofit/>
           </a:bodyPr>
           <a:lstStyle/>
@@ -4801,15 +5166,20 @@
               <a:buChar char="Ø"/>
             </a:pPr>
             <a:r>
-              <a:rPr lang="en-US" sz="2800" b="1" i="1" dirty="0" smtClean="0">
-                <a:latin typeface="Aparajita" pitchFamily="34" charset="0"/>
-                <a:cs typeface="Aparajita" pitchFamily="34" charset="0"/>
-              </a:rPr>
-              <a:t>Advantages of TestNG</a:t>
-            </a:r>
-          </a:p>
-          <a:p>
-            <a:pPr marL="571500" indent="-571500">
+              <a:rPr lang="en-US" sz="2200" b="1" i="1" dirty="0" smtClean="0">
+                <a:solidFill>
+                  <a:schemeClr val="accent4">
+                    <a:lumMod val="75000"/>
+                  </a:schemeClr>
+                </a:solidFill>
+                <a:latin typeface="Aparajita" pitchFamily="34" charset="0"/>
+                <a:cs typeface="Aparajita" pitchFamily="34" charset="0"/>
+              </a:rPr>
+              <a:t>What is TestNG</a:t>
+            </a:r>
+          </a:p>
+          <a:p>
+            <a:pPr marL="857250" indent="-857250">
               <a:buClr>
                 <a:srgbClr val="00B0F0"/>
               </a:buClr>
@@ -4817,15 +5187,15 @@
               <a:buAutoNum type="romanLcPeriod"/>
             </a:pPr>
             <a:r>
-              <a:rPr lang="en-US" sz="2800" dirty="0" smtClean="0">
-                <a:latin typeface="Aparajita" pitchFamily="34" charset="0"/>
-                <a:cs typeface="Aparajita" pitchFamily="34" charset="0"/>
-              </a:rPr>
-              <a:t>Default Reporting</a:t>
-            </a:r>
-          </a:p>
-          <a:p>
-            <a:pPr marL="571500" indent="-571500">
+              <a:rPr lang="en-US" sz="2200" dirty="0" smtClean="0">
+                <a:latin typeface="Aparajita" pitchFamily="34" charset="0"/>
+                <a:cs typeface="Aparajita" pitchFamily="34" charset="0"/>
+              </a:rPr>
+              <a:t>TestNG is open source test automation framework which in inspired from JUnit</a:t>
+            </a:r>
+          </a:p>
+          <a:p>
+            <a:pPr marL="857250" indent="-857250">
               <a:buClr>
                 <a:srgbClr val="00B0F0"/>
               </a:buClr>
@@ -4833,131 +5203,13 @@
               <a:buAutoNum type="romanLcPeriod"/>
             </a:pPr>
             <a:r>
-              <a:rPr lang="en-US" sz="2800" dirty="0" smtClean="0">
-                <a:latin typeface="Aparajita" pitchFamily="34" charset="0"/>
-                <a:cs typeface="Aparajita" pitchFamily="34" charset="0"/>
-              </a:rPr>
-              <a:t>Supports of Listeners </a:t>
-            </a:r>
-          </a:p>
-          <a:p>
-            <a:pPr marL="571500" indent="-571500">
-              <a:buClr>
-                <a:srgbClr val="00B0F0"/>
-              </a:buClr>
-              <a:buFont typeface="+mj-lt"/>
-              <a:buAutoNum type="romanLcPeriod"/>
-            </a:pPr>
-            <a:r>
-              <a:rPr lang="en-US" sz="2800" dirty="0" smtClean="0">
-                <a:latin typeface="Aparajita" pitchFamily="34" charset="0"/>
-                <a:cs typeface="Aparajita" pitchFamily="34" charset="0"/>
-              </a:rPr>
-              <a:t>Supports of Advanced Annotations</a:t>
-            </a:r>
-          </a:p>
-          <a:p>
-            <a:pPr marL="571500" indent="-571500">
-              <a:buClr>
-                <a:srgbClr val="00B0F0"/>
-              </a:buClr>
-              <a:buFont typeface="+mj-lt"/>
-              <a:buAutoNum type="romanLcPeriod"/>
-            </a:pPr>
-            <a:r>
-              <a:rPr lang="en-US" sz="2800" dirty="0" smtClean="0">
-                <a:latin typeface="Aparajita" pitchFamily="34" charset="0"/>
-                <a:cs typeface="Aparajita" pitchFamily="34" charset="0"/>
-              </a:rPr>
-              <a:t>Easy and flexible test Configurations</a:t>
-            </a:r>
-          </a:p>
-          <a:p>
-            <a:pPr marL="571500" indent="-571500">
-              <a:buClr>
-                <a:srgbClr val="00B0F0"/>
-              </a:buClr>
-              <a:buFont typeface="+mj-lt"/>
-              <a:buAutoNum type="romanLcPeriod"/>
-            </a:pPr>
-            <a:r>
-              <a:rPr lang="en-US" sz="2800" dirty="0" smtClean="0">
-                <a:latin typeface="Aparajita" pitchFamily="34" charset="0"/>
-                <a:cs typeface="Aparajita" pitchFamily="34" charset="0"/>
-              </a:rPr>
-              <a:t>Supports for data driven testing(with @data provider)</a:t>
-            </a:r>
-          </a:p>
-          <a:p>
-            <a:pPr marL="571500" indent="-571500">
-              <a:buClr>
-                <a:srgbClr val="00B0F0"/>
-              </a:buClr>
-              <a:buFont typeface="+mj-lt"/>
-              <a:buAutoNum type="romanLcPeriod"/>
-            </a:pPr>
-            <a:r>
-              <a:rPr lang="en-US" sz="2800" dirty="0" smtClean="0">
-                <a:latin typeface="Aparajita" pitchFamily="34" charset="0"/>
-                <a:cs typeface="Aparajita" pitchFamily="34" charset="0"/>
-              </a:rPr>
-              <a:t>Supports of parameter</a:t>
-            </a:r>
-          </a:p>
-          <a:p>
-            <a:pPr marL="571500" indent="-571500">
-              <a:buClr>
-                <a:srgbClr val="00B0F0"/>
-              </a:buClr>
-              <a:buFont typeface="+mj-lt"/>
-              <a:buAutoNum type="romanLcPeriod"/>
-            </a:pPr>
-            <a:r>
-              <a:rPr lang="en-US" sz="2800" dirty="0" smtClean="0">
-                <a:latin typeface="Aparajita" pitchFamily="34" charset="0"/>
-                <a:cs typeface="Aparajita" pitchFamily="34" charset="0"/>
-              </a:rPr>
-              <a:t>Easy way to execute Test Suite</a:t>
-            </a:r>
-          </a:p>
-          <a:p>
-            <a:pPr marL="571500" indent="-571500">
-              <a:buClr>
-                <a:srgbClr val="00B0F0"/>
-              </a:buClr>
-              <a:buFont typeface="+mj-lt"/>
-              <a:buAutoNum type="romanLcPeriod"/>
-            </a:pPr>
-            <a:r>
-              <a:rPr lang="en-US" sz="2800" dirty="0" smtClean="0">
-                <a:latin typeface="Aparajita" pitchFamily="34" charset="0"/>
-                <a:cs typeface="Aparajita" pitchFamily="34" charset="0"/>
-              </a:rPr>
-              <a:t>Supports Parallel  execution</a:t>
-            </a:r>
-          </a:p>
-          <a:p>
-            <a:pPr marL="571500" indent="-571500">
-              <a:buClr>
-                <a:srgbClr val="00B0F0"/>
-              </a:buClr>
-              <a:buFont typeface="+mj-lt"/>
-              <a:buAutoNum type="romanLcPeriod"/>
-            </a:pPr>
-            <a:r>
-              <a:rPr lang="en-US" sz="2800" dirty="0" smtClean="0">
-                <a:latin typeface="Aparajita" pitchFamily="34" charset="0"/>
-                <a:cs typeface="Aparajita" pitchFamily="34" charset="0"/>
-              </a:rPr>
-              <a:t>Grouping feature and many more. </a:t>
-            </a:r>
-          </a:p>
-          <a:p>
-            <a:pPr marL="857250" indent="-857250">
-              <a:buFont typeface="+mj-lt"/>
-              <a:buAutoNum type="romanLcPeriod"/>
-            </a:pPr>
-            <a:endParaRPr lang="en-US" sz="2800" dirty="0" smtClean="0">
+              <a:rPr lang="en-US" sz="2200" dirty="0" smtClean="0">
+                <a:latin typeface="Aparajita" pitchFamily="34" charset="0"/>
+                <a:cs typeface="Aparajita" pitchFamily="34" charset="0"/>
+              </a:rPr>
+              <a:t>TestNG has multiple classes, interface and methods.</a:t>
+            </a:r>
+            <a:endParaRPr lang="en-US" sz="2200" dirty="0" smtClean="0">
               <a:solidFill>
                 <a:schemeClr val="accent6">
                   <a:lumMod val="50000"/>
@@ -4968,6 +5220,85 @@
             </a:endParaRPr>
           </a:p>
           <a:p>
+            <a:pPr marL="342900" indent="-342900">
+              <a:buClr>
+                <a:srgbClr val="00B0F0"/>
+              </a:buClr>
+              <a:buFont typeface="Wingdings" pitchFamily="2" charset="2"/>
+              <a:buChar char="Ø"/>
+            </a:pPr>
+            <a:r>
+              <a:rPr lang="en-US" sz="2200" dirty="0" smtClean="0">
+                <a:solidFill>
+                  <a:schemeClr val="accent6">
+                    <a:lumMod val="50000"/>
+                  </a:schemeClr>
+                </a:solidFill>
+                <a:latin typeface="Aparajita" pitchFamily="34" charset="0"/>
+                <a:cs typeface="Aparajita" pitchFamily="34" charset="0"/>
+              </a:rPr>
+              <a:t>  </a:t>
+            </a:r>
+            <a:endParaRPr lang="en-US" sz="2800" i="1" dirty="0">
+              <a:solidFill>
+                <a:schemeClr val="tx2">
+                  <a:lumMod val="75000"/>
+                </a:schemeClr>
+              </a:solidFill>
+              <a:latin typeface="Aparajita" pitchFamily="34" charset="0"/>
+              <a:cs typeface="Aparajita" pitchFamily="34" charset="0"/>
+            </a:endParaRPr>
+          </a:p>
+          <a:p>
+            <a:endParaRPr lang="en-US" sz="2800" i="1" dirty="0" smtClean="0">
+              <a:solidFill>
+                <a:schemeClr val="tx2">
+                  <a:lumMod val="75000"/>
+                </a:schemeClr>
+              </a:solidFill>
+              <a:latin typeface="Aparajita" pitchFamily="34" charset="0"/>
+              <a:cs typeface="Aparajita" pitchFamily="34" charset="0"/>
+            </a:endParaRPr>
+          </a:p>
+          <a:p>
+            <a:endParaRPr lang="en-US" sz="2800" i="1" dirty="0" smtClean="0">
+              <a:solidFill>
+                <a:schemeClr val="tx2">
+                  <a:lumMod val="75000"/>
+                </a:schemeClr>
+              </a:solidFill>
+              <a:latin typeface="Aparajita" pitchFamily="34" charset="0"/>
+              <a:cs typeface="Aparajita" pitchFamily="34" charset="0"/>
+            </a:endParaRPr>
+          </a:p>
+          <a:p>
+            <a:endParaRPr lang="en-US" sz="2600" dirty="0">
+              <a:solidFill>
+                <a:schemeClr val="tx2">
+                  <a:lumMod val="75000"/>
+                </a:schemeClr>
+              </a:solidFill>
+            </a:endParaRPr>
+          </a:p>
+          <a:p>
+            <a:endParaRPr lang="en-US" sz="2600" dirty="0">
+              <a:solidFill>
+                <a:schemeClr val="tx2">
+                  <a:lumMod val="75000"/>
+                </a:schemeClr>
+              </a:solidFill>
+            </a:endParaRPr>
+          </a:p>
+          <a:p>
+            <a:endParaRPr lang="en-US" sz="3600" dirty="0" smtClean="0">
+              <a:solidFill>
+                <a:schemeClr val="accent6">
+                  <a:lumMod val="50000"/>
+                </a:schemeClr>
+              </a:solidFill>
+            </a:endParaRPr>
+          </a:p>
+          <a:p>
             <a:pPr marL="571500" indent="-571500">
               <a:buFont typeface="Arial" pitchFamily="34" charset="0"/>
               <a:buChar char="•"/>
@@ -4982,10 +5313,51 @@
           </a:p>
         </p:txBody>
       </p:sp>
+      <p:pic>
+        <p:nvPicPr>
+          <p:cNvPr id="1026" name="Picture 2" descr="C:\Users\vostro\Desktop\Testng.png"/>
+          <p:cNvPicPr>
+            <a:picLocks noChangeAspect="1" noChangeArrowheads="1"/>
+          </p:cNvPicPr>
+          <p:nvPr/>
+        </p:nvPicPr>
+        <p:blipFill>
+          <a:blip r:embed="rId2">
+            <a:extLst>
+              <a:ext uri="{28A0092B-C50C-407E-A947-70E740481C1C}">
+                <a14:useLocalDpi xmlns:a14="http://schemas.microsoft.com/office/drawing/2010/main" val="0"/>
+              </a:ext>
+            </a:extLst>
+          </a:blip>
+          <a:srcRect/>
+          <a:stretch>
+            <a:fillRect/>
+          </a:stretch>
+        </p:blipFill>
+        <p:spPr bwMode="auto">
+          <a:xfrm>
+            <a:off x="685800" y="2209800"/>
+            <a:ext cx="5657850" cy="3233883"/>
+          </a:xfrm>
+          <a:prstGeom prst="rect">
+            <a:avLst/>
+          </a:prstGeom>
+          <a:noFill/>
+          <a:extLst>
+            <a:ext uri="{909E8E84-426E-40DD-AFC4-6F175D3DCCD1}">
+              <a14:hiddenFill xmlns:a14="http://schemas.microsoft.com/office/drawing/2010/main">
+                <a:solidFill>
+                  <a:srgbClr val="FFFFFF"/>
+                </a:solidFill>
+              </a14:hiddenFill>
+            </a:ext>
+          </a:extLst>
+        </p:spPr>
+      </p:pic>
     </p:spTree>
     <p:extLst>
       <p:ext uri="{BB962C8B-B14F-4D97-AF65-F5344CB8AC3E}">
-        <p14:creationId xmlns:p14="http://schemas.microsoft.com/office/powerpoint/2010/main" val="2971481840"/>
+        <p14:creationId xmlns:p14="http://schemas.microsoft.com/office/powerpoint/2010/main" val="1926581561"/>
       </p:ext>
     </p:extLst>
   </p:cSld>
@@ -5051,20 +5423,7 @@
                 <a:latin typeface="Aparajita" pitchFamily="34" charset="0"/>
                 <a:cs typeface="Aparajita" pitchFamily="34" charset="0"/>
               </a:rPr>
-              <a:t>Test </a:t>
-            </a:r>
-            <a:r>
-              <a:rPr lang="en-US" sz="4800" i="1" dirty="0" err="1" smtClean="0">
-                <a:solidFill>
-                  <a:schemeClr val="tx1">
-                    <a:lumMod val="75000"/>
-                    <a:lumOff val="25000"/>
-                  </a:schemeClr>
-                </a:solidFill>
-                <a:latin typeface="Aparajita" pitchFamily="34" charset="0"/>
-                <a:cs typeface="Aparajita" pitchFamily="34" charset="0"/>
-              </a:rPr>
-              <a:t>ng</a:t>
+              <a:t>Test NG</a:t>
             </a:r>
             <a:endParaRPr lang="en-US" sz="4800" i="1" dirty="0">
               <a:solidFill>
@@ -5091,13 +5450,13 @@
         </p:nvSpPr>
         <p:spPr>
           <a:xfrm>
-            <a:off x="0" y="838200"/>
-            <a:ext cx="9067800" cy="6019800"/>
+            <a:off x="0" y="1219200"/>
+            <a:ext cx="8305800" cy="5410200"/>
           </a:xfrm>
         </p:spPr>
         <p:txBody>
-          <a:bodyPr numCol="1">
-            <a:normAutofit lnSpcReduction="10000"/>
+          <a:bodyPr>
+            <a:normAutofit/>
           </a:bodyPr>
           <a:lstStyle/>
           <a:p>
@@ -5109,20 +5468,15 @@
               <a:buChar char="Ø"/>
             </a:pPr>
             <a:r>
-              <a:rPr lang="en-US" sz="2200" b="1" i="1" dirty="0" smtClean="0">
-                <a:solidFill>
-                  <a:schemeClr val="accent4">
-                    <a:lumMod val="75000"/>
-                  </a:schemeClr>
-                </a:solidFill>
-                <a:latin typeface="Aparajita" pitchFamily="34" charset="0"/>
-                <a:cs typeface="Aparajita" pitchFamily="34" charset="0"/>
-              </a:rPr>
-              <a:t>What is Listener</a:t>
-            </a:r>
-          </a:p>
-          <a:p>
-            <a:pPr marL="857250" indent="-857250">
+              <a:rPr lang="en-US" sz="2800" b="1" i="1" dirty="0" smtClean="0">
+                <a:latin typeface="Aparajita" pitchFamily="34" charset="0"/>
+                <a:cs typeface="Aparajita" pitchFamily="34" charset="0"/>
+              </a:rPr>
+              <a:t>Advantages of TestNG</a:t>
+            </a:r>
+          </a:p>
+          <a:p>
+            <a:pPr marL="571500" indent="-571500">
               <a:buClr>
                 <a:srgbClr val="00B0F0"/>
               </a:buClr>
@@ -5130,15 +5484,15 @@
               <a:buAutoNum type="romanLcPeriod"/>
             </a:pPr>
             <a:r>
-              <a:rPr lang="en-US" sz="2200" dirty="0" smtClean="0">
-                <a:latin typeface="Aparajita" pitchFamily="34" charset="0"/>
-                <a:cs typeface="Aparajita" pitchFamily="34" charset="0"/>
-              </a:rPr>
-              <a:t>Listener is important feature in TestNG which used to customize logs. And report of TestNG</a:t>
-            </a:r>
-          </a:p>
-          <a:p>
-            <a:pPr marL="857250" indent="-857250">
+              <a:rPr lang="en-US" sz="2800" dirty="0" smtClean="0">
+                <a:latin typeface="Aparajita" pitchFamily="34" charset="0"/>
+                <a:cs typeface="Aparajita" pitchFamily="34" charset="0"/>
+              </a:rPr>
+              <a:t>Default Reporting</a:t>
+            </a:r>
+          </a:p>
+          <a:p>
+            <a:pPr marL="571500" indent="-571500">
               <a:buClr>
                 <a:srgbClr val="00B0F0"/>
               </a:buClr>
@@ -5146,13 +5500,131 @@
               <a:buAutoNum type="romanLcPeriod"/>
             </a:pPr>
             <a:r>
-              <a:rPr lang="en-US" sz="2200" dirty="0" smtClean="0">
-                <a:latin typeface="Aparajita" pitchFamily="34" charset="0"/>
-                <a:cs typeface="Aparajita" pitchFamily="34" charset="0"/>
-              </a:rPr>
-              <a:t>As the name says it listen to certain event and act accordingly</a:t>
-            </a:r>
-            <a:endParaRPr lang="en-US" sz="2200" dirty="0" smtClean="0">
+              <a:rPr lang="en-US" sz="2800" dirty="0" smtClean="0">
+                <a:latin typeface="Aparajita" pitchFamily="34" charset="0"/>
+                <a:cs typeface="Aparajita" pitchFamily="34" charset="0"/>
+              </a:rPr>
+              <a:t>Supports of Listeners </a:t>
+            </a:r>
+          </a:p>
+          <a:p>
+            <a:pPr marL="571500" indent="-571500">
+              <a:buClr>
+                <a:srgbClr val="00B0F0"/>
+              </a:buClr>
+              <a:buFont typeface="+mj-lt"/>
+              <a:buAutoNum type="romanLcPeriod"/>
+            </a:pPr>
+            <a:r>
+              <a:rPr lang="en-US" sz="2800" dirty="0" smtClean="0">
+                <a:latin typeface="Aparajita" pitchFamily="34" charset="0"/>
+                <a:cs typeface="Aparajita" pitchFamily="34" charset="0"/>
+              </a:rPr>
+              <a:t>Supports of Advanced Annotations</a:t>
+            </a:r>
+          </a:p>
+          <a:p>
+            <a:pPr marL="571500" indent="-571500">
+              <a:buClr>
+                <a:srgbClr val="00B0F0"/>
+              </a:buClr>
+              <a:buFont typeface="+mj-lt"/>
+              <a:buAutoNum type="romanLcPeriod"/>
+            </a:pPr>
+            <a:r>
+              <a:rPr lang="en-US" sz="2800" dirty="0" smtClean="0">
+                <a:latin typeface="Aparajita" pitchFamily="34" charset="0"/>
+                <a:cs typeface="Aparajita" pitchFamily="34" charset="0"/>
+              </a:rPr>
+              <a:t>Easy and flexible test Configurations</a:t>
+            </a:r>
+          </a:p>
+          <a:p>
+            <a:pPr marL="571500" indent="-571500">
+              <a:buClr>
+                <a:srgbClr val="00B0F0"/>
+              </a:buClr>
+              <a:buFont typeface="+mj-lt"/>
+              <a:buAutoNum type="romanLcPeriod"/>
+            </a:pPr>
+            <a:r>
+              <a:rPr lang="en-US" sz="2800" dirty="0" smtClean="0">
+                <a:latin typeface="Aparajita" pitchFamily="34" charset="0"/>
+                <a:cs typeface="Aparajita" pitchFamily="34" charset="0"/>
+              </a:rPr>
+              <a:t>Supports for data driven testing(with @data provider)</a:t>
+            </a:r>
+          </a:p>
+          <a:p>
+            <a:pPr marL="571500" indent="-571500">
+              <a:buClr>
+                <a:srgbClr val="00B0F0"/>
+              </a:buClr>
+              <a:buFont typeface="+mj-lt"/>
+              <a:buAutoNum type="romanLcPeriod"/>
+            </a:pPr>
+            <a:r>
+              <a:rPr lang="en-US" sz="2800" dirty="0" smtClean="0">
+                <a:latin typeface="Aparajita" pitchFamily="34" charset="0"/>
+                <a:cs typeface="Aparajita" pitchFamily="34" charset="0"/>
+              </a:rPr>
+              <a:t>Supports of parameter</a:t>
+            </a:r>
+          </a:p>
+          <a:p>
+            <a:pPr marL="571500" indent="-571500">
+              <a:buClr>
+                <a:srgbClr val="00B0F0"/>
+              </a:buClr>
+              <a:buFont typeface="+mj-lt"/>
+              <a:buAutoNum type="romanLcPeriod"/>
+            </a:pPr>
+            <a:r>
+              <a:rPr lang="en-US" sz="2800" dirty="0" smtClean="0">
+                <a:latin typeface="Aparajita" pitchFamily="34" charset="0"/>
+                <a:cs typeface="Aparajita" pitchFamily="34" charset="0"/>
+              </a:rPr>
+              <a:t>Easy way to execute Test Suite</a:t>
+            </a:r>
+          </a:p>
+          <a:p>
+            <a:pPr marL="571500" indent="-571500">
+              <a:buClr>
+                <a:srgbClr val="00B0F0"/>
+              </a:buClr>
+              <a:buFont typeface="+mj-lt"/>
+              <a:buAutoNum type="romanLcPeriod"/>
+            </a:pPr>
+            <a:r>
+              <a:rPr lang="en-US" sz="2800" dirty="0" smtClean="0">
+                <a:latin typeface="Aparajita" pitchFamily="34" charset="0"/>
+                <a:cs typeface="Aparajita" pitchFamily="34" charset="0"/>
+              </a:rPr>
+              <a:t>Supports Parallel  execution</a:t>
+            </a:r>
+          </a:p>
+          <a:p>
+            <a:pPr marL="571500" indent="-571500">
+              <a:buClr>
+                <a:srgbClr val="00B0F0"/>
+              </a:buClr>
+              <a:buFont typeface="+mj-lt"/>
+              <a:buAutoNum type="romanLcPeriod"/>
+            </a:pPr>
+            <a:r>
+              <a:rPr lang="en-US" sz="2800" dirty="0" smtClean="0">
+                <a:latin typeface="Aparajita" pitchFamily="34" charset="0"/>
+                <a:cs typeface="Aparajita" pitchFamily="34" charset="0"/>
+              </a:rPr>
+              <a:t>Grouping and Dependencies feature and many more. </a:t>
+            </a:r>
+          </a:p>
+          <a:p>
+            <a:pPr marL="857250" indent="-857250">
+              <a:buFont typeface="+mj-lt"/>
+              <a:buAutoNum type="romanLcPeriod"/>
+            </a:pPr>
+            <a:endParaRPr lang="en-US" sz="2800" dirty="0" smtClean="0">
               <a:solidFill>
                 <a:schemeClr val="accent6">
                   <a:lumMod val="50000"/>
@@ -5163,272 +5635,6 @@
             </a:endParaRPr>
           </a:p>
           <a:p>
-            <a:pPr marL="342900" indent="-342900">
-              <a:buClr>
-                <a:srgbClr val="00B0F0"/>
-              </a:buClr>
-              <a:buFont typeface="Wingdings" pitchFamily="2" charset="2"/>
-              <a:buChar char="Ø"/>
-            </a:pPr>
-            <a:r>
-              <a:rPr lang="en-US" sz="2200" dirty="0" smtClean="0">
-                <a:solidFill>
-                  <a:schemeClr val="accent6">
-                    <a:lumMod val="50000"/>
-                  </a:schemeClr>
-                </a:solidFill>
-                <a:latin typeface="Aparajita" pitchFamily="34" charset="0"/>
-                <a:cs typeface="Aparajita" pitchFamily="34" charset="0"/>
-              </a:rPr>
-              <a:t>  </a:t>
-            </a:r>
-            <a:r>
-              <a:rPr lang="en-US" sz="2200" b="1" i="1" dirty="0" smtClean="0">
-                <a:solidFill>
-                  <a:schemeClr val="accent5">
-                    <a:lumMod val="50000"/>
-                  </a:schemeClr>
-                </a:solidFill>
-                <a:latin typeface="Aparajita" pitchFamily="34" charset="0"/>
-                <a:cs typeface="Aparajita" pitchFamily="34" charset="0"/>
-              </a:rPr>
-              <a:t>Type of Listeners</a:t>
-            </a:r>
-          </a:p>
-          <a:p>
-            <a:pPr marL="571500" indent="-571500" algn="just">
-              <a:buClr>
-                <a:srgbClr val="00B0F0"/>
-              </a:buClr>
-              <a:buFont typeface="+mj-lt"/>
-              <a:buAutoNum type="romanLcPeriod"/>
-            </a:pPr>
-            <a:r>
-              <a:rPr lang="en-US" sz="2200" dirty="0" smtClean="0">
-                <a:latin typeface="Aparajita" pitchFamily="34" charset="0"/>
-                <a:cs typeface="Aparajita" pitchFamily="34" charset="0"/>
-              </a:rPr>
-              <a:t>IAnnotation Transformer</a:t>
-            </a:r>
-          </a:p>
-          <a:p>
-            <a:pPr marL="571500" indent="-571500" algn="just">
-              <a:buClr>
-                <a:srgbClr val="00B0F0"/>
-              </a:buClr>
-              <a:buFont typeface="+mj-lt"/>
-              <a:buAutoNum type="romanLcPeriod"/>
-            </a:pPr>
-            <a:r>
-              <a:rPr lang="en-US" sz="2200" dirty="0" smtClean="0">
-                <a:latin typeface="Aparajita" pitchFamily="34" charset="0"/>
-                <a:cs typeface="Aparajita" pitchFamily="34" charset="0"/>
-              </a:rPr>
-              <a:t>IHookable</a:t>
-            </a:r>
-          </a:p>
-          <a:p>
-            <a:pPr marL="571500" indent="-571500" algn="just">
-              <a:buClr>
-                <a:srgbClr val="00B0F0"/>
-              </a:buClr>
-              <a:buFont typeface="+mj-lt"/>
-              <a:buAutoNum type="romanLcPeriod"/>
-            </a:pPr>
-            <a:r>
-              <a:rPr lang="en-US" sz="2200" dirty="0" smtClean="0">
-                <a:latin typeface="Aparajita" pitchFamily="34" charset="0"/>
-                <a:cs typeface="Aparajita" pitchFamily="34" charset="0"/>
-              </a:rPr>
-              <a:t>IInvokedMethod Listner</a:t>
-            </a:r>
-          </a:p>
-          <a:p>
-            <a:pPr marL="571500" indent="-571500" algn="just">
-              <a:buClr>
-                <a:srgbClr val="00B0F0"/>
-              </a:buClr>
-              <a:buFont typeface="+mj-lt"/>
-              <a:buAutoNum type="romanLcPeriod"/>
-            </a:pPr>
-            <a:r>
-              <a:rPr lang="en-US" sz="2200" dirty="0" smtClean="0">
-                <a:latin typeface="Aparajita" pitchFamily="34" charset="0"/>
-                <a:cs typeface="Aparajita" pitchFamily="34" charset="0"/>
-              </a:rPr>
-              <a:t>IMethodInterceptor</a:t>
-            </a:r>
-          </a:p>
-          <a:p>
-            <a:pPr marL="571500" indent="-571500" algn="just">
-              <a:buClr>
-                <a:srgbClr val="00B0F0"/>
-              </a:buClr>
-              <a:buFont typeface="+mj-lt"/>
-              <a:buAutoNum type="romanLcPeriod"/>
-            </a:pPr>
-            <a:r>
-              <a:rPr lang="en-US" sz="2200" dirty="0" smtClean="0">
-                <a:latin typeface="Aparajita" pitchFamily="34" charset="0"/>
-                <a:cs typeface="Aparajita" pitchFamily="34" charset="0"/>
-              </a:rPr>
-              <a:t>IReporter</a:t>
-            </a:r>
-          </a:p>
-          <a:p>
-            <a:pPr marL="571500" indent="-571500">
-              <a:buClr>
-                <a:srgbClr val="00B0F0"/>
-              </a:buClr>
-              <a:buFont typeface="+mj-lt"/>
-              <a:buAutoNum type="romanLcPeriod"/>
-            </a:pPr>
-            <a:r>
-              <a:rPr lang="en-US" sz="2200" b="1" dirty="0" err="1" smtClean="0">
-                <a:latin typeface="Aparajita" pitchFamily="34" charset="0"/>
-                <a:cs typeface="Aparajita" pitchFamily="34" charset="0"/>
-              </a:rPr>
-              <a:t>ITestListener</a:t>
-            </a:r>
-            <a:endParaRPr lang="en-US" sz="2200" b="1" dirty="0" smtClean="0">
-              <a:latin typeface="Aparajita" pitchFamily="34" charset="0"/>
-              <a:cs typeface="Aparajita" pitchFamily="34" charset="0"/>
-            </a:endParaRPr>
-          </a:p>
-          <a:p>
-            <a:pPr marL="342900" indent="-342900">
-              <a:buClr>
-                <a:srgbClr val="00B0F0"/>
-              </a:buClr>
-              <a:buFont typeface="Wingdings" pitchFamily="2" charset="2"/>
-              <a:buChar char="v"/>
-            </a:pPr>
-            <a:r>
-              <a:rPr lang="en-US" sz="2200" b="1" dirty="0" smtClean="0">
-                <a:latin typeface="Aparajita" pitchFamily="34" charset="0"/>
-                <a:cs typeface="Aparajita" pitchFamily="34" charset="0"/>
-              </a:rPr>
-              <a:t>Way To Implement Listner</a:t>
-            </a:r>
-          </a:p>
-          <a:p>
-            <a:pPr marL="571500" indent="-571500">
-              <a:buClr>
-                <a:srgbClr val="00B0F0"/>
-              </a:buClr>
-              <a:buFont typeface="+mj-lt"/>
-              <a:buAutoNum type="romanLcPeriod"/>
-            </a:pPr>
-            <a:r>
-              <a:rPr lang="en-US" sz="2200" dirty="0" smtClean="0">
-                <a:latin typeface="Aparajita" pitchFamily="34" charset="0"/>
-                <a:cs typeface="Aparajita" pitchFamily="34" charset="0"/>
-              </a:rPr>
-              <a:t>Class Level</a:t>
-            </a:r>
-          </a:p>
-          <a:p>
-            <a:pPr marL="571500" indent="-571500">
-              <a:buClr>
-                <a:srgbClr val="00B0F0"/>
-              </a:buClr>
-              <a:buFont typeface="+mj-lt"/>
-              <a:buAutoNum type="romanLcPeriod"/>
-            </a:pPr>
-            <a:r>
-              <a:rPr lang="en-US" sz="2200" dirty="0" smtClean="0">
-                <a:latin typeface="Aparajita" pitchFamily="34" charset="0"/>
-                <a:cs typeface="Aparajita" pitchFamily="34" charset="0"/>
-              </a:rPr>
-              <a:t>Suite Level</a:t>
-            </a:r>
-            <a:endParaRPr lang="en-US" sz="2200" b="1" dirty="0" smtClean="0">
-              <a:latin typeface="Aparajita" pitchFamily="34" charset="0"/>
-              <a:cs typeface="Aparajita" pitchFamily="34" charset="0"/>
-            </a:endParaRPr>
-          </a:p>
-          <a:p>
-            <a:r>
-              <a:rPr lang="en-US" sz="2400" b="1" dirty="0" smtClean="0">
-                <a:latin typeface="Aparajita" pitchFamily="34" charset="0"/>
-                <a:cs typeface="Aparajita" pitchFamily="34" charset="0"/>
-              </a:rPr>
-              <a:t>Source:-</a:t>
-            </a:r>
-            <a:r>
-              <a:rPr lang="en-US" sz="2800" i="1" dirty="0" smtClean="0">
-                <a:solidFill>
-                  <a:schemeClr val="tx2">
-                    <a:lumMod val="75000"/>
-                  </a:schemeClr>
-                </a:solidFill>
-                <a:latin typeface="Aparajita" pitchFamily="34" charset="0"/>
-                <a:cs typeface="Aparajita" pitchFamily="34" charset="0"/>
-              </a:rPr>
-              <a:t>http://testng.org</a:t>
-            </a:r>
-          </a:p>
-          <a:p>
-            <a:endParaRPr lang="en-US" sz="2800" i="1" dirty="0">
-              <a:solidFill>
-                <a:schemeClr val="tx2">
-                  <a:lumMod val="75000"/>
-                </a:schemeClr>
-              </a:solidFill>
-              <a:latin typeface="Aparajita" pitchFamily="34" charset="0"/>
-              <a:cs typeface="Aparajita" pitchFamily="34" charset="0"/>
-            </a:endParaRPr>
-          </a:p>
-          <a:p>
-            <a:endParaRPr lang="en-US" sz="2800" i="1" dirty="0" smtClean="0">
-              <a:solidFill>
-                <a:schemeClr val="tx2">
-                  <a:lumMod val="75000"/>
-                </a:schemeClr>
-              </a:solidFill>
-              <a:latin typeface="Aparajita" pitchFamily="34" charset="0"/>
-              <a:cs typeface="Aparajita" pitchFamily="34" charset="0"/>
-            </a:endParaRPr>
-          </a:p>
-          <a:p>
-            <a:endParaRPr lang="en-US" sz="2800" i="1" dirty="0" smtClean="0">
-              <a:solidFill>
-                <a:schemeClr val="tx2">
-                  <a:lumMod val="75000"/>
-                </a:schemeClr>
-              </a:solidFill>
-              <a:latin typeface="Aparajita" pitchFamily="34" charset="0"/>
-              <a:cs typeface="Aparajita" pitchFamily="34" charset="0"/>
-            </a:endParaRPr>
-          </a:p>
-          <a:p>
-            <a:endParaRPr lang="en-US" sz="2600" dirty="0">
-              <a:solidFill>
-                <a:schemeClr val="tx2">
-                  <a:lumMod val="75000"/>
-                </a:schemeClr>
-              </a:solidFill>
-            </a:endParaRPr>
-          </a:p>
-          <a:p>
-            <a:endParaRPr lang="en-US" sz="2600" dirty="0">
-              <a:solidFill>
-                <a:schemeClr val="tx2">
-                  <a:lumMod val="75000"/>
-                </a:schemeClr>
-              </a:solidFill>
-            </a:endParaRPr>
-          </a:p>
-          <a:p>
-            <a:endParaRPr lang="en-US" sz="3600" dirty="0" smtClean="0">
-              <a:solidFill>
-                <a:schemeClr val="accent6">
-                  <a:lumMod val="50000"/>
-                </a:schemeClr>
-              </a:solidFill>
-            </a:endParaRPr>
-          </a:p>
-          <a:p>
             <a:pPr marL="571500" indent="-571500">
               <a:buFont typeface="Arial" pitchFamily="34" charset="0"/>
               <a:buChar char="•"/>
@@ -5446,7 +5652,7 @@
     </p:spTree>
     <p:extLst>
       <p:ext uri="{BB962C8B-B14F-4D97-AF65-F5344CB8AC3E}">
-        <p14:creationId xmlns:p14="http://schemas.microsoft.com/office/powerpoint/2010/main" val="3550431653"/>
+        <p14:creationId xmlns:p14="http://schemas.microsoft.com/office/powerpoint/2010/main" val="2971481840"/>
       </p:ext>
     </p:extLst>
   </p:cSld>
@@ -5568,15 +5774,6 @@
               </a:rPr>
               <a:t>TestNG Annotations</a:t>
             </a:r>
-            <a:endParaRPr lang="en-US" sz="2200" b="1" i="1" dirty="0" smtClean="0">
-              <a:solidFill>
-                <a:schemeClr val="accent4">
-                  <a:lumMod val="75000"/>
-                </a:schemeClr>
-              </a:solidFill>
-              <a:latin typeface="Aparajita" pitchFamily="34" charset="0"/>
-              <a:cs typeface="Aparajita" pitchFamily="34" charset="0"/>
-            </a:endParaRPr>
           </a:p>
           <a:p>
             <a:pPr marL="514350" indent="-514350">
@@ -5867,10 +6064,6 @@
               </a:rPr>
               <a:t>: The annotated method is a part of a test case</a:t>
             </a:r>
-            <a:endParaRPr lang="en-US" sz="2300" dirty="0">
-              <a:latin typeface="Aparajita" pitchFamily="34" charset="0"/>
-              <a:cs typeface="Aparajita" pitchFamily="34" charset="0"/>
-            </a:endParaRPr>
           </a:p>
           <a:p>
             <a:pPr marL="514350" indent="-514350">
@@ -5923,14 +6116,7 @@
                 <a:latin typeface="Aparajita" pitchFamily="34" charset="0"/>
                 <a:cs typeface="Aparajita" pitchFamily="34" charset="0"/>
               </a:rPr>
-              <a:t>Source</a:t>
-            </a:r>
-            <a:r>
-              <a:rPr lang="en-US" sz="2400" b="1" dirty="0" smtClean="0">
-                <a:latin typeface="Aparajita" pitchFamily="34" charset="0"/>
-                <a:cs typeface="Aparajita" pitchFamily="34" charset="0"/>
-              </a:rPr>
-              <a:t>:-</a:t>
+              <a:t>Source:-</a:t>
             </a:r>
             <a:r>
               <a:rPr lang="en-US" sz="2800" i="1" dirty="0" smtClean="0">
@@ -6501,39 +6687,283 @@
 </p:sld>
 </file>
 
+<file path=ppt/slides/slide9.xml><?xml version="1.0" encoding="utf-8"?>
+<p:sld xmlns:a="http://schemas.openxmlformats.org/drawingml/2006/main" xmlns:r="http://schemas.openxmlformats.org/officeDocument/2006/relationships" xmlns:p="http://schemas.openxmlformats.org/presentationml/2006/main" showMasterSp="0">
+  <p:cSld>
+    <p:spTree>
+      <p:nvGrpSpPr>
+        <p:cNvPr id="1" name=""/>
+        <p:cNvGrpSpPr/>
+        <p:nvPr/>
+      </p:nvGrpSpPr>
+      <p:grpSpPr>
+        <a:xfrm>
+          <a:off x="0" y="0"/>
+          <a:ext cx="0" cy="0"/>
+          <a:chOff x="0" y="0"/>
+          <a:chExt cx="0" cy="0"/>
+        </a:xfrm>
+      </p:grpSpPr>
+      <p:sp>
+        <p:nvSpPr>
+          <p:cNvPr id="2" name="Title 1"/>
+          <p:cNvSpPr>
+            <a:spLocks noGrp="1"/>
+          </p:cNvSpPr>
+          <p:nvPr>
+            <p:ph type="ctrTitle"/>
+          </p:nvPr>
+        </p:nvSpPr>
+        <p:spPr>
+          <a:xfrm>
+            <a:off x="685800" y="76201"/>
+            <a:ext cx="7543800" cy="914400"/>
+          </a:xfrm>
+        </p:spPr>
+        <p:txBody>
+          <a:bodyPr/>
+          <a:lstStyle/>
+          <a:p>
+            <a:pPr algn="ctr"/>
+            <a:r>
+              <a:rPr lang="en-US" sz="4800" i="1" dirty="0" smtClean="0">
+                <a:solidFill>
+                  <a:schemeClr val="tx1">
+                    <a:lumMod val="75000"/>
+                    <a:lumOff val="25000"/>
+                  </a:schemeClr>
+                </a:solidFill>
+                <a:latin typeface="Aparajita" pitchFamily="34" charset="0"/>
+                <a:cs typeface="Aparajita" pitchFamily="34" charset="0"/>
+              </a:rPr>
+              <a:t>Extent Report</a:t>
+            </a:r>
+            <a:endParaRPr lang="en-US" sz="4800" i="1" dirty="0">
+              <a:solidFill>
+                <a:schemeClr val="tx1">
+                  <a:lumMod val="75000"/>
+                  <a:lumOff val="25000"/>
+                </a:schemeClr>
+              </a:solidFill>
+              <a:latin typeface="Aparajita" pitchFamily="34" charset="0"/>
+              <a:cs typeface="Aparajita" pitchFamily="34" charset="0"/>
+            </a:endParaRPr>
+          </a:p>
+        </p:txBody>
+      </p:sp>
+      <p:sp>
+        <p:nvSpPr>
+          <p:cNvPr id="3" name="Subtitle 2"/>
+          <p:cNvSpPr>
+            <a:spLocks noGrp="1"/>
+          </p:cNvSpPr>
+          <p:nvPr>
+            <p:ph type="subTitle" idx="1"/>
+          </p:nvPr>
+        </p:nvSpPr>
+        <p:spPr>
+          <a:xfrm>
+            <a:off x="0" y="914400"/>
+            <a:ext cx="9144000" cy="5715000"/>
+          </a:xfrm>
+        </p:spPr>
+        <p:txBody>
+          <a:bodyPr>
+            <a:normAutofit/>
+          </a:bodyPr>
+          <a:lstStyle/>
+          <a:p>
+            <a:pPr marL="571500" indent="-571500">
+              <a:buClr>
+                <a:srgbClr val="00B0F0"/>
+              </a:buClr>
+              <a:buFont typeface="Wingdings" pitchFamily="2" charset="2"/>
+              <a:buChar char="Ø"/>
+            </a:pPr>
+            <a:r>
+              <a:rPr lang="en-US" sz="2800" b="1" i="1" dirty="0" smtClean="0">
+                <a:latin typeface="Aparajita" pitchFamily="34" charset="0"/>
+                <a:cs typeface="Aparajita" pitchFamily="34" charset="0"/>
+              </a:rPr>
+              <a:t>What is Extent Report</a:t>
+            </a:r>
+          </a:p>
+          <a:p>
+            <a:pPr marL="571500" indent="-571500">
+              <a:buClr>
+                <a:srgbClr val="00B0F0"/>
+              </a:buClr>
+              <a:buFont typeface="+mj-lt"/>
+              <a:buAutoNum type="romanLcPeriod"/>
+            </a:pPr>
+            <a:r>
+              <a:rPr lang="en-US" sz="2000" i="1" dirty="0">
+                <a:latin typeface="Aparajita" pitchFamily="34" charset="0"/>
+                <a:cs typeface="Aparajita" pitchFamily="34" charset="0"/>
+              </a:rPr>
+              <a:t>Extent Report is a HTML reporting library for Selenium</a:t>
+            </a:r>
+            <a:r>
+              <a:rPr lang="en-US" sz="2000" dirty="0" smtClean="0">
+                <a:latin typeface="Aparajita" pitchFamily="34" charset="0"/>
+                <a:cs typeface="Aparajita" pitchFamily="34" charset="0"/>
+              </a:rPr>
+              <a:t>.</a:t>
+            </a:r>
+          </a:p>
+          <a:p>
+            <a:pPr marL="571500" indent="-571500">
+              <a:buClr>
+                <a:srgbClr val="00B0F0"/>
+              </a:buClr>
+              <a:buFont typeface="+mj-lt"/>
+              <a:buAutoNum type="romanLcPeriod"/>
+            </a:pPr>
+            <a:r>
+              <a:rPr lang="en-US" sz="2000" i="1" dirty="0">
+                <a:latin typeface="Aparajita" pitchFamily="34" charset="0"/>
+                <a:cs typeface="Aparajita" pitchFamily="34" charset="0"/>
+              </a:rPr>
+              <a:t>We can use this tool within our TestNG  and BDD automation framework</a:t>
+            </a:r>
+            <a:r>
+              <a:rPr lang="en-US" sz="2000" i="1" dirty="0" smtClean="0">
+                <a:latin typeface="Aparajita" pitchFamily="34" charset="0"/>
+                <a:cs typeface="Aparajita" pitchFamily="34" charset="0"/>
+              </a:rPr>
+              <a:t>.</a:t>
+            </a:r>
+          </a:p>
+          <a:p>
+            <a:pPr marL="571500" indent="-571500">
+              <a:buClr>
+                <a:srgbClr val="00B0F0"/>
+              </a:buClr>
+              <a:buFont typeface="+mj-lt"/>
+              <a:buAutoNum type="romanLcPeriod"/>
+            </a:pPr>
+            <a:r>
+              <a:rPr lang="en-US" sz="2000" i="1" dirty="0">
+                <a:latin typeface="Aparajita" pitchFamily="34" charset="0"/>
+                <a:cs typeface="Aparajita" pitchFamily="34" charset="0"/>
+              </a:rPr>
+              <a:t>Download Extent report library from </a:t>
+            </a:r>
+            <a:r>
+              <a:rPr lang="en-US" sz="2000" b="1" i="1" u="sng" dirty="0">
+                <a:solidFill>
+                  <a:srgbClr val="00B0F0"/>
+                </a:solidFill>
+                <a:latin typeface="Aparajita" pitchFamily="34" charset="0"/>
+                <a:cs typeface="Aparajita" pitchFamily="34" charset="0"/>
+              </a:rPr>
+              <a:t>http://</a:t>
+            </a:r>
+            <a:r>
+              <a:rPr lang="en-US" sz="2000" b="1" i="1" u="sng" dirty="0" smtClean="0">
+                <a:solidFill>
+                  <a:srgbClr val="00B0F0"/>
+                </a:solidFill>
+                <a:latin typeface="Aparajita" pitchFamily="34" charset="0"/>
+                <a:cs typeface="Aparajita" pitchFamily="34" charset="0"/>
+              </a:rPr>
+              <a:t>extentreports.com</a:t>
+            </a:r>
+            <a:r>
+              <a:rPr lang="en-US" sz="2000" i="1" dirty="0" smtClean="0">
+                <a:latin typeface="Aparajita" pitchFamily="34" charset="0"/>
+                <a:cs typeface="Aparajita" pitchFamily="34" charset="0"/>
+              </a:rPr>
+              <a:t>	</a:t>
+            </a:r>
+            <a:endParaRPr lang="en-US" sz="2000" dirty="0" smtClean="0">
+              <a:latin typeface="Aparajita" pitchFamily="34" charset="0"/>
+              <a:cs typeface="Aparajita" pitchFamily="34" charset="0"/>
+            </a:endParaRPr>
+          </a:p>
+          <a:p>
+            <a:pPr marL="857250" indent="-857250">
+              <a:buFont typeface="+mj-lt"/>
+              <a:buAutoNum type="romanLcPeriod"/>
+            </a:pPr>
+            <a:endParaRPr lang="en-US" sz="2800" dirty="0" smtClean="0">
+              <a:solidFill>
+                <a:schemeClr val="accent6">
+                  <a:lumMod val="50000"/>
+                </a:schemeClr>
+              </a:solidFill>
+              <a:latin typeface="Aparajita" pitchFamily="34" charset="0"/>
+              <a:cs typeface="Aparajita" pitchFamily="34" charset="0"/>
+            </a:endParaRPr>
+          </a:p>
+          <a:p>
+            <a:pPr marL="571500" indent="-571500">
+              <a:buFont typeface="Arial" pitchFamily="34" charset="0"/>
+              <a:buChar char="•"/>
+            </a:pPr>
+            <a:endParaRPr lang="en-US" sz="3600" dirty="0">
+              <a:solidFill>
+                <a:schemeClr val="accent6">
+                  <a:lumMod val="50000"/>
+                </a:schemeClr>
+              </a:solidFill>
+            </a:endParaRPr>
+          </a:p>
+        </p:txBody>
+      </p:sp>
+    </p:spTree>
+    <p:extLst>
+      <p:ext uri="{BB962C8B-B14F-4D97-AF65-F5344CB8AC3E}">
+        <p14:creationId xmlns:p14="http://schemas.microsoft.com/office/powerpoint/2010/main" val="371780410"/>
+      </p:ext>
+    </p:extLst>
+  </p:cSld>
+  <p:clrMapOvr>
+    <a:masterClrMapping/>
+  </p:clrMapOvr>
+  <p:timing>
+    <p:tnLst>
+      <p:par>
+        <p:cTn id="1" dur="indefinite" restart="never" nodeType="tmRoot"/>
+      </p:par>
+    </p:tnLst>
+  </p:timing>
+</p:sld>
+</file>
+
 <file path=ppt/theme/theme1.xml><?xml version="1.0" encoding="utf-8"?>
 <a:theme xmlns:a="http://schemas.openxmlformats.org/drawingml/2006/main" name="Clarity">
   <a:themeElements>
-    <a:clrScheme name="Clarity">
+    <a:clrScheme name="Office">
       <a:dk1>
-        <a:srgbClr val="292934"/>
+        <a:sysClr val="windowText" lastClr="000000"/>
       </a:dk1>
       <a:lt1>
-        <a:srgbClr val="FFFFFF"/>
+        <a:sysClr val="window" lastClr="FFFFFF"/>
       </a:lt1>
       <a:dk2>
-        <a:srgbClr val="D2533C"/>
+        <a:srgbClr val="1F497D"/>
       </a:dk2>
       <a:lt2>
-        <a:srgbClr val="F3F2DC"/>
+        <a:srgbClr val="EEECE1"/>
       </a:lt2>
       <a:accent1>
-        <a:srgbClr val="93A299"/>
+        <a:srgbClr val="4F81BD"/>
       </a:accent1>
       <a:accent2>
-        <a:srgbClr val="AD8F67"/>
+        <a:srgbClr val="C0504D"/>
       </a:accent2>
       <a:accent3>
-        <a:srgbClr val="726056"/>
+        <a:srgbClr val="9BBB59"/>
       </a:accent3>
       <a:accent4>
-        <a:srgbClr val="4C5A6A"/>
+        <a:srgbClr val="8064A2"/>
       </a:accent4>
       <a:accent5>
-        <a:srgbClr val="808DA0"/>
+        <a:srgbClr val="4BACC6"/>
       </a:accent5>
       <a:accent6>
-        <a:srgbClr val="79463D"/>
+        <a:srgbClr val="F79646"/>
       </a:accent6>
       <a:hlink>
         <a:srgbClr val="0000FF"/>

</xml_diff>